<commit_message>
Added Dr.Cox reference to the presentation issueID #3
</commit_message>
<xml_diff>
--- a/Presentations/Thesis skills 1.pptx
+++ b/Presentations/Thesis skills 1.pptx
@@ -11,6 +11,7 @@
     <p:sldId id="259" r:id="rId5"/>
     <p:sldId id="260" r:id="rId6"/>
     <p:sldId id="261" r:id="rId7"/>
+    <p:sldId id="262" r:id="rId8"/>
   </p:sldIdLst>
   <p:sldSz cx="9144000" cy="6858000" type="screen4x3"/>
   <p:notesSz cx="6858000" cy="9144000"/>
@@ -294,7 +295,7 @@
             <a:fld id="{1D8BD707-D9CF-40AE-B4C6-C98DA3205C09}" type="datetimeFigureOut">
               <a:rPr lang="en-US" smtClean="0"/>
               <a:pPr/>
-              <a:t>2/4/2014</a:t>
+              <a:t>2/5/2014</a:t>
             </a:fld>
             <a:endParaRPr lang="en-US"/>
           </a:p>
@@ -461,7 +462,7 @@
             <a:fld id="{1D8BD707-D9CF-40AE-B4C6-C98DA3205C09}" type="datetimeFigureOut">
               <a:rPr lang="en-US" smtClean="0"/>
               <a:pPr/>
-              <a:t>2/4/2014</a:t>
+              <a:t>2/5/2014</a:t>
             </a:fld>
             <a:endParaRPr lang="en-US"/>
           </a:p>
@@ -638,7 +639,7 @@
             <a:fld id="{1D8BD707-D9CF-40AE-B4C6-C98DA3205C09}" type="datetimeFigureOut">
               <a:rPr lang="en-US" smtClean="0"/>
               <a:pPr/>
-              <a:t>2/4/2014</a:t>
+              <a:t>2/5/2014</a:t>
             </a:fld>
             <a:endParaRPr lang="en-US"/>
           </a:p>
@@ -805,7 +806,7 @@
             <a:fld id="{1D8BD707-D9CF-40AE-B4C6-C98DA3205C09}" type="datetimeFigureOut">
               <a:rPr lang="en-US" smtClean="0"/>
               <a:pPr/>
-              <a:t>2/4/2014</a:t>
+              <a:t>2/5/2014</a:t>
             </a:fld>
             <a:endParaRPr lang="en-US"/>
           </a:p>
@@ -1048,7 +1049,7 @@
             <a:fld id="{1D8BD707-D9CF-40AE-B4C6-C98DA3205C09}" type="datetimeFigureOut">
               <a:rPr lang="en-US" smtClean="0"/>
               <a:pPr/>
-              <a:t>2/4/2014</a:t>
+              <a:t>2/5/2014</a:t>
             </a:fld>
             <a:endParaRPr lang="en-US"/>
           </a:p>
@@ -1333,7 +1334,7 @@
             <a:fld id="{1D8BD707-D9CF-40AE-B4C6-C98DA3205C09}" type="datetimeFigureOut">
               <a:rPr lang="en-US" smtClean="0"/>
               <a:pPr/>
-              <a:t>2/4/2014</a:t>
+              <a:t>2/5/2014</a:t>
             </a:fld>
             <a:endParaRPr lang="en-US"/>
           </a:p>
@@ -1752,7 +1753,7 @@
             <a:fld id="{1D8BD707-D9CF-40AE-B4C6-C98DA3205C09}" type="datetimeFigureOut">
               <a:rPr lang="en-US" smtClean="0"/>
               <a:pPr/>
-              <a:t>2/4/2014</a:t>
+              <a:t>2/5/2014</a:t>
             </a:fld>
             <a:endParaRPr lang="en-US"/>
           </a:p>
@@ -1867,7 +1868,7 @@
             <a:fld id="{1D8BD707-D9CF-40AE-B4C6-C98DA3205C09}" type="datetimeFigureOut">
               <a:rPr lang="en-US" smtClean="0"/>
               <a:pPr/>
-              <a:t>2/4/2014</a:t>
+              <a:t>2/5/2014</a:t>
             </a:fld>
             <a:endParaRPr lang="en-US"/>
           </a:p>
@@ -1959,7 +1960,7 @@
             <a:fld id="{1D8BD707-D9CF-40AE-B4C6-C98DA3205C09}" type="datetimeFigureOut">
               <a:rPr lang="en-US" smtClean="0"/>
               <a:pPr/>
-              <a:t>2/4/2014</a:t>
+              <a:t>2/5/2014</a:t>
             </a:fld>
             <a:endParaRPr lang="en-US"/>
           </a:p>
@@ -2233,7 +2234,7 @@
             <a:fld id="{1D8BD707-D9CF-40AE-B4C6-C98DA3205C09}" type="datetimeFigureOut">
               <a:rPr lang="en-US" smtClean="0"/>
               <a:pPr/>
-              <a:t>2/4/2014</a:t>
+              <a:t>2/5/2014</a:t>
             </a:fld>
             <a:endParaRPr lang="en-US"/>
           </a:p>
@@ -2483,7 +2484,7 @@
             <a:fld id="{1D8BD707-D9CF-40AE-B4C6-C98DA3205C09}" type="datetimeFigureOut">
               <a:rPr lang="en-US" smtClean="0"/>
               <a:pPr/>
-              <a:t>2/4/2014</a:t>
+              <a:t>2/5/2014</a:t>
             </a:fld>
             <a:endParaRPr lang="en-US"/>
           </a:p>
@@ -2693,7 +2694,7 @@
             <a:fld id="{1D8BD707-D9CF-40AE-B4C6-C98DA3205C09}" type="datetimeFigureOut">
               <a:rPr lang="en-US" smtClean="0"/>
               <a:pPr/>
-              <a:t>2/4/2014</a:t>
+              <a:t>2/5/2014</a:t>
             </a:fld>
             <a:endParaRPr lang="en-US"/>
           </a:p>
@@ -3195,11 +3196,7 @@
           <a:p>
             <a:r>
               <a:rPr lang="en-GB" dirty="0" smtClean="0"/>
-              <a:t>Outlin</a:t>
-            </a:r>
-            <a:r>
-              <a:rPr lang="en-GB" dirty="0" smtClean="0"/>
-              <a:t>e</a:t>
+              <a:t>Outline</a:t>
             </a:r>
             <a:endParaRPr lang="en-GB" dirty="0"/>
           </a:p>
@@ -3347,15 +3344,7 @@
             <a:pPr lvl="1"/>
             <a:r>
               <a:rPr lang="en-GB" dirty="0" smtClean="0"/>
-              <a:t>Fact : about 30% of death in world is because </a:t>
-            </a:r>
-            <a:r>
-              <a:rPr lang="en-GB" dirty="0" smtClean="0"/>
-              <a:t>of </a:t>
-            </a:r>
-            <a:r>
-              <a:rPr lang="en-GB" dirty="0" smtClean="0"/>
-              <a:t>atherosclerosis or some other cardiovascular diseases</a:t>
+              <a:t>Fact : about 30% of death in world is because of atherosclerosis or some other cardiovascular diseases</a:t>
             </a:r>
           </a:p>
         </p:txBody>
@@ -3548,11 +3537,7 @@
             <a:pPr lvl="1"/>
             <a:r>
               <a:rPr lang="en-GB" dirty="0" smtClean="0"/>
-              <a:t>If yes, give yourself a </a:t>
-            </a:r>
-            <a:r>
-              <a:rPr lang="en-GB" dirty="0" smtClean="0"/>
-              <a:t>clap</a:t>
+              <a:t>If yes, give yourself a clap</a:t>
             </a:r>
           </a:p>
           <a:p>
@@ -3649,6 +3634,120 @@
               <a:t>Identify central disease(risk) modifiers</a:t>
             </a:r>
             <a:endParaRPr lang="en-GB" dirty="0"/>
+          </a:p>
+        </p:txBody>
+      </p:sp>
+    </p:spTree>
+  </p:cSld>
+  <p:clrMapOvr>
+    <a:masterClrMapping/>
+  </p:clrMapOvr>
+</p:sld>
+</file>
+
+<file path=ppt/slides/slide7.xml><?xml version="1.0" encoding="utf-8"?>
+<p:sld xmlns:a="http://schemas.openxmlformats.org/drawingml/2006/main" xmlns:r="http://schemas.openxmlformats.org/officeDocument/2006/relationships" xmlns:p="http://schemas.openxmlformats.org/presentationml/2006/main">
+  <p:cSld>
+    <p:spTree>
+      <p:nvGrpSpPr>
+        <p:cNvPr id="1" name=""/>
+        <p:cNvGrpSpPr/>
+        <p:nvPr/>
+      </p:nvGrpSpPr>
+      <p:grpSpPr>
+        <a:xfrm>
+          <a:off x="0" y="0"/>
+          <a:ext cx="0" cy="0"/>
+          <a:chOff x="0" y="0"/>
+          <a:chExt cx="0" cy="0"/>
+        </a:xfrm>
+      </p:grpSpPr>
+      <p:sp>
+        <p:nvSpPr>
+          <p:cNvPr id="2" name="Title 1"/>
+          <p:cNvSpPr>
+            <a:spLocks noGrp="1"/>
+          </p:cNvSpPr>
+          <p:nvPr>
+            <p:ph type="title"/>
+          </p:nvPr>
+        </p:nvSpPr>
+        <p:spPr/>
+        <p:txBody>
+          <a:bodyPr/>
+          <a:lstStyle/>
+          <a:p>
+            <a:r>
+              <a:rPr lang="en-GB" dirty="0" smtClean="0"/>
+              <a:t>One more slide</a:t>
+            </a:r>
+            <a:endParaRPr lang="en-GB" dirty="0"/>
+          </a:p>
+        </p:txBody>
+      </p:sp>
+      <p:sp>
+        <p:nvSpPr>
+          <p:cNvPr id="3" name="Content Placeholder 2"/>
+          <p:cNvSpPr>
+            <a:spLocks noGrp="1"/>
+          </p:cNvSpPr>
+          <p:nvPr>
+            <p:ph idx="1"/>
+          </p:nvPr>
+        </p:nvSpPr>
+        <p:spPr/>
+        <p:txBody>
+          <a:bodyPr>
+            <a:normAutofit/>
+          </a:bodyPr>
+          <a:lstStyle/>
+          <a:p>
+            <a:r>
+              <a:rPr lang="en-GB" sz="2800" dirty="0" smtClean="0"/>
+              <a:t>Quote from Scrubs(medical comedy TV series):</a:t>
+            </a:r>
+          </a:p>
+          <a:p>
+            <a:pPr lvl="1"/>
+            <a:r>
+              <a:rPr lang="en-GB" sz="2400" smtClean="0"/>
+              <a:t>Turns </a:t>
+            </a:r>
+            <a:r>
+              <a:rPr lang="en-GB" sz="2400" dirty="0" smtClean="0"/>
+              <a:t>out, whatever </a:t>
+            </a:r>
+            <a:r>
+              <a:rPr lang="en-GB" sz="2400" dirty="0" smtClean="0"/>
+              <a:t>one knows </a:t>
+            </a:r>
+            <a:r>
+              <a:rPr lang="en-GB" sz="2400" dirty="0" smtClean="0"/>
+              <a:t>about medicine, ultimately, luck or fate or God or...who knows what is always </a:t>
+            </a:r>
+            <a:r>
+              <a:rPr lang="en-GB" sz="2400" dirty="0" smtClean="0"/>
+              <a:t>going to </a:t>
+            </a:r>
+            <a:r>
+              <a:rPr lang="en-GB" sz="2400" dirty="0" smtClean="0"/>
+              <a:t>end up playing a much bigger role in the whole thing than </a:t>
+            </a:r>
+            <a:r>
+              <a:rPr lang="en-GB" sz="2400" dirty="0" smtClean="0"/>
+              <a:t>someone </a:t>
+            </a:r>
+            <a:r>
+              <a:rPr lang="en-GB" sz="2400" dirty="0" smtClean="0"/>
+              <a:t>ever will</a:t>
+            </a:r>
+            <a:r>
+              <a:rPr lang="en-GB" sz="2400" dirty="0" smtClean="0"/>
+              <a:t>.</a:t>
+            </a:r>
+          </a:p>
+          <a:p>
+            <a:endParaRPr lang="en-GB" sz="2800" dirty="0"/>
           </a:p>
         </p:txBody>
       </p:sp>

</xml_diff>

<commit_message>
Dries, thank you man! issueID #3
</commit_message>
<xml_diff>
--- a/Presentations/Thesis skills 1.pptx
+++ b/Presentations/Thesis skills 1.pptx
@@ -11,7 +11,6 @@
     <p:sldId id="259" r:id="rId5"/>
     <p:sldId id="260" r:id="rId6"/>
     <p:sldId id="261" r:id="rId7"/>
-    <p:sldId id="262" r:id="rId8"/>
   </p:sldIdLst>
   <p:sldSz cx="9144000" cy="6858000" type="screen4x3"/>
   <p:notesSz cx="6858000" cy="9144000"/>
@@ -295,7 +294,7 @@
             <a:fld id="{1D8BD707-D9CF-40AE-B4C6-C98DA3205C09}" type="datetimeFigureOut">
               <a:rPr lang="en-US" smtClean="0"/>
               <a:pPr/>
-              <a:t>2/5/2014</a:t>
+              <a:t>2/7/2014</a:t>
             </a:fld>
             <a:endParaRPr lang="en-US"/>
           </a:p>
@@ -462,7 +461,7 @@
             <a:fld id="{1D8BD707-D9CF-40AE-B4C6-C98DA3205C09}" type="datetimeFigureOut">
               <a:rPr lang="en-US" smtClean="0"/>
               <a:pPr/>
-              <a:t>2/5/2014</a:t>
+              <a:t>2/7/2014</a:t>
             </a:fld>
             <a:endParaRPr lang="en-US"/>
           </a:p>
@@ -639,7 +638,7 @@
             <a:fld id="{1D8BD707-D9CF-40AE-B4C6-C98DA3205C09}" type="datetimeFigureOut">
               <a:rPr lang="en-US" smtClean="0"/>
               <a:pPr/>
-              <a:t>2/5/2014</a:t>
+              <a:t>2/7/2014</a:t>
             </a:fld>
             <a:endParaRPr lang="en-US"/>
           </a:p>
@@ -806,7 +805,7 @@
             <a:fld id="{1D8BD707-D9CF-40AE-B4C6-C98DA3205C09}" type="datetimeFigureOut">
               <a:rPr lang="en-US" smtClean="0"/>
               <a:pPr/>
-              <a:t>2/5/2014</a:t>
+              <a:t>2/7/2014</a:t>
             </a:fld>
             <a:endParaRPr lang="en-US"/>
           </a:p>
@@ -1049,7 +1048,7 @@
             <a:fld id="{1D8BD707-D9CF-40AE-B4C6-C98DA3205C09}" type="datetimeFigureOut">
               <a:rPr lang="en-US" smtClean="0"/>
               <a:pPr/>
-              <a:t>2/5/2014</a:t>
+              <a:t>2/7/2014</a:t>
             </a:fld>
             <a:endParaRPr lang="en-US"/>
           </a:p>
@@ -1334,7 +1333,7 @@
             <a:fld id="{1D8BD707-D9CF-40AE-B4C6-C98DA3205C09}" type="datetimeFigureOut">
               <a:rPr lang="en-US" smtClean="0"/>
               <a:pPr/>
-              <a:t>2/5/2014</a:t>
+              <a:t>2/7/2014</a:t>
             </a:fld>
             <a:endParaRPr lang="en-US"/>
           </a:p>
@@ -1753,7 +1752,7 @@
             <a:fld id="{1D8BD707-D9CF-40AE-B4C6-C98DA3205C09}" type="datetimeFigureOut">
               <a:rPr lang="en-US" smtClean="0"/>
               <a:pPr/>
-              <a:t>2/5/2014</a:t>
+              <a:t>2/7/2014</a:t>
             </a:fld>
             <a:endParaRPr lang="en-US"/>
           </a:p>
@@ -1868,7 +1867,7 @@
             <a:fld id="{1D8BD707-D9CF-40AE-B4C6-C98DA3205C09}" type="datetimeFigureOut">
               <a:rPr lang="en-US" smtClean="0"/>
               <a:pPr/>
-              <a:t>2/5/2014</a:t>
+              <a:t>2/7/2014</a:t>
             </a:fld>
             <a:endParaRPr lang="en-US"/>
           </a:p>
@@ -1960,7 +1959,7 @@
             <a:fld id="{1D8BD707-D9CF-40AE-B4C6-C98DA3205C09}" type="datetimeFigureOut">
               <a:rPr lang="en-US" smtClean="0"/>
               <a:pPr/>
-              <a:t>2/5/2014</a:t>
+              <a:t>2/7/2014</a:t>
             </a:fld>
             <a:endParaRPr lang="en-US"/>
           </a:p>
@@ -2234,7 +2233,7 @@
             <a:fld id="{1D8BD707-D9CF-40AE-B4C6-C98DA3205C09}" type="datetimeFigureOut">
               <a:rPr lang="en-US" smtClean="0"/>
               <a:pPr/>
-              <a:t>2/5/2014</a:t>
+              <a:t>2/7/2014</a:t>
             </a:fld>
             <a:endParaRPr lang="en-US"/>
           </a:p>
@@ -2484,7 +2483,7 @@
             <a:fld id="{1D8BD707-D9CF-40AE-B4C6-C98DA3205C09}" type="datetimeFigureOut">
               <a:rPr lang="en-US" smtClean="0"/>
               <a:pPr/>
-              <a:t>2/5/2014</a:t>
+              <a:t>2/7/2014</a:t>
             </a:fld>
             <a:endParaRPr lang="en-US"/>
           </a:p>
@@ -2694,7 +2693,7 @@
             <a:fld id="{1D8BD707-D9CF-40AE-B4C6-C98DA3205C09}" type="datetimeFigureOut">
               <a:rPr lang="en-US" smtClean="0"/>
               <a:pPr/>
-              <a:t>2/5/2014</a:t>
+              <a:t>2/7/2014</a:t>
             </a:fld>
             <a:endParaRPr lang="en-US"/>
           </a:p>
@@ -3159,6 +3158,13 @@
   <p:clrMapOvr>
     <a:masterClrMapping/>
   </p:clrMapOvr>
+  <p:timing>
+    <p:tnLst>
+      <p:par>
+        <p:cTn id="1" dur="indefinite" restart="never" nodeType="tmRoot"/>
+      </p:par>
+    </p:tnLst>
+  </p:timing>
 </p:sld>
 </file>
 
@@ -3255,6 +3261,13 @@
   <p:clrMapOvr>
     <a:masterClrMapping/>
   </p:clrMapOvr>
+  <p:timing>
+    <p:tnLst>
+      <p:par>
+        <p:cTn id="1" dur="indefinite" restart="never" nodeType="tmRoot"/>
+      </p:par>
+    </p:tnLst>
+  </p:timing>
 </p:sld>
 </file>
 
@@ -3311,7 +3324,7 @@
         <p:spPr/>
         <p:txBody>
           <a:bodyPr>
-            <a:normAutofit lnSpcReduction="10000"/>
+            <a:normAutofit fontScale="92500"/>
           </a:bodyPr>
           <a:lstStyle/>
           <a:p>
@@ -3344,8 +3357,20 @@
             <a:pPr lvl="1"/>
             <a:r>
               <a:rPr lang="en-GB" dirty="0" smtClean="0"/>
-              <a:t>Fact : about 30% of death in world is because of atherosclerosis or some other cardiovascular diseases</a:t>
-            </a:r>
+              <a:t>Fact : about 30% of death in world is because of atherosclerosis or some other cardiovascular </a:t>
+            </a:r>
+            <a:r>
+              <a:rPr lang="en-GB" dirty="0" smtClean="0"/>
+              <a:t>diseases</a:t>
+            </a:r>
+          </a:p>
+          <a:p>
+            <a:pPr lvl="1"/>
+            <a:r>
+              <a:rPr lang="en-GB" dirty="0" smtClean="0"/>
+              <a:t>Another fact : There is no single person alive with no heartbeat</a:t>
+            </a:r>
+            <a:endParaRPr lang="en-GB" dirty="0" smtClean="0"/>
           </a:p>
         </p:txBody>
       </p:sp>
@@ -3354,6 +3379,13 @@
   <p:clrMapOvr>
     <a:masterClrMapping/>
   </p:clrMapOvr>
+  <p:timing>
+    <p:tnLst>
+      <p:par>
+        <p:cTn id="1" dur="indefinite" restart="never" nodeType="tmRoot"/>
+      </p:par>
+    </p:tnLst>
+  </p:timing>
 </p:sld>
 </file>
 
@@ -3431,6 +3463,13 @@
   <p:clrMapOvr>
     <a:masterClrMapping/>
   </p:clrMapOvr>
+  <p:timing>
+    <p:tnLst>
+      <p:par>
+        <p:cTn id="1" dur="indefinite" restart="never" nodeType="tmRoot"/>
+      </p:par>
+    </p:tnLst>
+  </p:timing>
 </p:sld>
 </file>
 
@@ -3565,6 +3604,13 @@
   <p:clrMapOvr>
     <a:masterClrMapping/>
   </p:clrMapOvr>
+  <p:timing>
+    <p:tnLst>
+      <p:par>
+        <p:cTn id="1" dur="indefinite" restart="never" nodeType="tmRoot"/>
+      </p:par>
+    </p:tnLst>
+  </p:timing>
 </p:sld>
 </file>
 
@@ -3642,120 +3688,13 @@
   <p:clrMapOvr>
     <a:masterClrMapping/>
   </p:clrMapOvr>
-</p:sld>
-</file>
-
-<file path=ppt/slides/slide7.xml><?xml version="1.0" encoding="utf-8"?>
-<p:sld xmlns:a="http://schemas.openxmlformats.org/drawingml/2006/main" xmlns:r="http://schemas.openxmlformats.org/officeDocument/2006/relationships" xmlns:p="http://schemas.openxmlformats.org/presentationml/2006/main">
-  <p:cSld>
-    <p:spTree>
-      <p:nvGrpSpPr>
-        <p:cNvPr id="1" name=""/>
-        <p:cNvGrpSpPr/>
-        <p:nvPr/>
-      </p:nvGrpSpPr>
-      <p:grpSpPr>
-        <a:xfrm>
-          <a:off x="0" y="0"/>
-          <a:ext cx="0" cy="0"/>
-          <a:chOff x="0" y="0"/>
-          <a:chExt cx="0" cy="0"/>
-        </a:xfrm>
-      </p:grpSpPr>
-      <p:sp>
-        <p:nvSpPr>
-          <p:cNvPr id="2" name="Title 1"/>
-          <p:cNvSpPr>
-            <a:spLocks noGrp="1"/>
-          </p:cNvSpPr>
-          <p:nvPr>
-            <p:ph type="title"/>
-          </p:nvPr>
-        </p:nvSpPr>
-        <p:spPr/>
-        <p:txBody>
-          <a:bodyPr/>
-          <a:lstStyle/>
-          <a:p>
-            <a:r>
-              <a:rPr lang="en-GB" dirty="0" smtClean="0"/>
-              <a:t>One more slide</a:t>
-            </a:r>
-            <a:endParaRPr lang="en-GB" dirty="0"/>
-          </a:p>
-        </p:txBody>
-      </p:sp>
-      <p:sp>
-        <p:nvSpPr>
-          <p:cNvPr id="3" name="Content Placeholder 2"/>
-          <p:cNvSpPr>
-            <a:spLocks noGrp="1"/>
-          </p:cNvSpPr>
-          <p:nvPr>
-            <p:ph idx="1"/>
-          </p:nvPr>
-        </p:nvSpPr>
-        <p:spPr/>
-        <p:txBody>
-          <a:bodyPr>
-            <a:normAutofit/>
-          </a:bodyPr>
-          <a:lstStyle/>
-          <a:p>
-            <a:r>
-              <a:rPr lang="en-GB" sz="2800" dirty="0" smtClean="0"/>
-              <a:t>Quote from Scrubs(medical comedy TV series):</a:t>
-            </a:r>
-          </a:p>
-          <a:p>
-            <a:pPr lvl="1"/>
-            <a:r>
-              <a:rPr lang="en-GB" sz="2400" smtClean="0"/>
-              <a:t>Turns </a:t>
-            </a:r>
-            <a:r>
-              <a:rPr lang="en-GB" sz="2400" dirty="0" smtClean="0"/>
-              <a:t>out, whatever </a:t>
-            </a:r>
-            <a:r>
-              <a:rPr lang="en-GB" sz="2400" dirty="0" smtClean="0"/>
-              <a:t>one knows </a:t>
-            </a:r>
-            <a:r>
-              <a:rPr lang="en-GB" sz="2400" dirty="0" smtClean="0"/>
-              <a:t>about medicine, ultimately, luck or fate or God or...who knows what is always </a:t>
-            </a:r>
-            <a:r>
-              <a:rPr lang="en-GB" sz="2400" dirty="0" smtClean="0"/>
-              <a:t>going to </a:t>
-            </a:r>
-            <a:r>
-              <a:rPr lang="en-GB" sz="2400" dirty="0" smtClean="0"/>
-              <a:t>end up playing a much bigger role in the whole thing than </a:t>
-            </a:r>
-            <a:r>
-              <a:rPr lang="en-GB" sz="2400" dirty="0" smtClean="0"/>
-              <a:t>someone </a:t>
-            </a:r>
-            <a:r>
-              <a:rPr lang="en-GB" sz="2400" dirty="0" smtClean="0"/>
-              <a:t>ever will</a:t>
-            </a:r>
-            <a:r>
-              <a:rPr lang="en-GB" sz="2400" dirty="0" smtClean="0"/>
-              <a:t>.</a:t>
-            </a:r>
-          </a:p>
-          <a:p>
-            <a:endParaRPr lang="en-GB" sz="2800" dirty="0"/>
-          </a:p>
-        </p:txBody>
-      </p:sp>
-    </p:spTree>
-  </p:cSld>
-  <p:clrMapOvr>
-    <a:masterClrMapping/>
-  </p:clrMapOvr>
+  <p:timing>
+    <p:tnLst>
+      <p:par>
+        <p:cTn id="1" dur="indefinite" restart="never" nodeType="tmRoot"/>
+      </p:par>
+    </p:tnLst>
+  </p:timing>
 </p:sld>
 </file>
 

</xml_diff>